<commit_message>
feat: Refatora estrutura de treinamentos e certificados
- Reestrutura a Central de Treinamentos para agrupar por NR.
- Corrige a exibição de datas e a passagem de variáveis para JavaScript nos templates.
- Adiciona script para atualização em lote de funcionários.
- Melhora a geração de certificados, com correções de bugs e preparação para download em lote.
</commit_message>
<xml_diff>
--- a/modelos_nr/NR06_modelo.pptx
+++ b/modelos_nr/NR06_modelo.pptx
@@ -252,7 +252,7 @@
           <a:p>
             <a:fld id="{A3B7E9CD-3D34-47C6-98EC-7A5BB634A5D7}" type="datetimeFigureOut">
               <a:rPr lang="pt-BR" smtClean="0"/>
-              <a:t>16/06/2025</a:t>
+              <a:t>29/06/2025</a:t>
             </a:fld>
             <a:endParaRPr lang="pt-BR"/>
           </a:p>
@@ -422,7 +422,7 @@
           <a:p>
             <a:fld id="{A3B7E9CD-3D34-47C6-98EC-7A5BB634A5D7}" type="datetimeFigureOut">
               <a:rPr lang="pt-BR" smtClean="0"/>
-              <a:t>16/06/2025</a:t>
+              <a:t>29/06/2025</a:t>
             </a:fld>
             <a:endParaRPr lang="pt-BR"/>
           </a:p>
@@ -602,7 +602,7 @@
           <a:p>
             <a:fld id="{A3B7E9CD-3D34-47C6-98EC-7A5BB634A5D7}" type="datetimeFigureOut">
               <a:rPr lang="pt-BR" smtClean="0"/>
-              <a:t>16/06/2025</a:t>
+              <a:t>29/06/2025</a:t>
             </a:fld>
             <a:endParaRPr lang="pt-BR"/>
           </a:p>
@@ -772,7 +772,7 @@
           <a:p>
             <a:fld id="{A3B7E9CD-3D34-47C6-98EC-7A5BB634A5D7}" type="datetimeFigureOut">
               <a:rPr lang="pt-BR" smtClean="0"/>
-              <a:t>16/06/2025</a:t>
+              <a:t>29/06/2025</a:t>
             </a:fld>
             <a:endParaRPr lang="pt-BR"/>
           </a:p>
@@ -1016,7 +1016,7 @@
           <a:p>
             <a:fld id="{A3B7E9CD-3D34-47C6-98EC-7A5BB634A5D7}" type="datetimeFigureOut">
               <a:rPr lang="pt-BR" smtClean="0"/>
-              <a:t>16/06/2025</a:t>
+              <a:t>29/06/2025</a:t>
             </a:fld>
             <a:endParaRPr lang="pt-BR"/>
           </a:p>
@@ -1248,7 +1248,7 @@
           <a:p>
             <a:fld id="{A3B7E9CD-3D34-47C6-98EC-7A5BB634A5D7}" type="datetimeFigureOut">
               <a:rPr lang="pt-BR" smtClean="0"/>
-              <a:t>16/06/2025</a:t>
+              <a:t>29/06/2025</a:t>
             </a:fld>
             <a:endParaRPr lang="pt-BR"/>
           </a:p>
@@ -1615,7 +1615,7 @@
           <a:p>
             <a:fld id="{A3B7E9CD-3D34-47C6-98EC-7A5BB634A5D7}" type="datetimeFigureOut">
               <a:rPr lang="pt-BR" smtClean="0"/>
-              <a:t>16/06/2025</a:t>
+              <a:t>29/06/2025</a:t>
             </a:fld>
             <a:endParaRPr lang="pt-BR"/>
           </a:p>
@@ -1733,7 +1733,7 @@
           <a:p>
             <a:fld id="{A3B7E9CD-3D34-47C6-98EC-7A5BB634A5D7}" type="datetimeFigureOut">
               <a:rPr lang="pt-BR" smtClean="0"/>
-              <a:t>16/06/2025</a:t>
+              <a:t>29/06/2025</a:t>
             </a:fld>
             <a:endParaRPr lang="pt-BR"/>
           </a:p>
@@ -1828,7 +1828,7 @@
           <a:p>
             <a:fld id="{A3B7E9CD-3D34-47C6-98EC-7A5BB634A5D7}" type="datetimeFigureOut">
               <a:rPr lang="pt-BR" smtClean="0"/>
-              <a:t>16/06/2025</a:t>
+              <a:t>29/06/2025</a:t>
             </a:fld>
             <a:endParaRPr lang="pt-BR"/>
           </a:p>
@@ -2105,7 +2105,7 @@
           <a:p>
             <a:fld id="{A3B7E9CD-3D34-47C6-98EC-7A5BB634A5D7}" type="datetimeFigureOut">
               <a:rPr lang="pt-BR" smtClean="0"/>
-              <a:t>16/06/2025</a:t>
+              <a:t>29/06/2025</a:t>
             </a:fld>
             <a:endParaRPr lang="pt-BR"/>
           </a:p>
@@ -2362,7 +2362,7 @@
           <a:p>
             <a:fld id="{A3B7E9CD-3D34-47C6-98EC-7A5BB634A5D7}" type="datetimeFigureOut">
               <a:rPr lang="pt-BR" smtClean="0"/>
-              <a:t>16/06/2025</a:t>
+              <a:t>29/06/2025</a:t>
             </a:fld>
             <a:endParaRPr lang="pt-BR"/>
           </a:p>
@@ -2575,7 +2575,7 @@
           <a:p>
             <a:fld id="{A3B7E9CD-3D34-47C6-98EC-7A5BB634A5D7}" type="datetimeFigureOut">
               <a:rPr lang="pt-BR" smtClean="0"/>
-              <a:t>16/06/2025</a:t>
+              <a:t>29/06/2025</a:t>
             </a:fld>
             <a:endParaRPr lang="pt-BR"/>
           </a:p>
@@ -3505,14 +3505,18 @@
           <a:p>
             <a:pPr algn="ctr"/>
             <a:r>
-              <a:rPr lang="pt-BR" sz="1400" dirty="0"/>
+              <a:rPr lang="pt-BR" sz="1400" dirty="0">
+                <a:latin typeface="Times New Roman" panose="02020603050405020304" pitchFamily="18" charset="0"/>
+                <a:cs typeface="Times New Roman" panose="02020603050405020304" pitchFamily="18" charset="0"/>
+              </a:rPr>
               <a:t>{{NOME}}</a:t>
             </a:r>
             <a:endParaRPr lang="pt-BR" altLang="zh-CN" sz="1228" b="1" dirty="0">
               <a:solidFill>
                 <a:srgbClr val="2D273D"/>
               </a:solidFill>
-              <a:cs typeface="+mn-ea"/>
+              <a:latin typeface="Times New Roman" panose="02020603050405020304" pitchFamily="18" charset="0"/>
+              <a:cs typeface="Times New Roman" panose="02020603050405020304" pitchFamily="18" charset="0"/>
               <a:sym typeface="+mn-lt"/>
             </a:endParaRPr>
           </a:p>
@@ -3780,8 +3784,8 @@
         </p:nvSpPr>
         <p:spPr>
           <a:xfrm>
-            <a:off x="4240531" y="3879156"/>
-            <a:ext cx="6311030" cy="1418017"/>
+            <a:off x="2914650" y="3827677"/>
+            <a:ext cx="7025938" cy="1384995"/>
           </a:xfrm>
           <a:prstGeom prst="rect">
             <a:avLst/>
@@ -3796,42 +3800,53 @@
           <a:p>
             <a:pPr algn="r"/>
             <a:r>
-              <a:rPr lang="pt-BR" altLang="ko-KR" sz="1403" dirty="0">
+              <a:rPr lang="pt-BR" altLang="ko-KR" sz="1400" b="1" dirty="0">
                 <a:latin typeface="Times New Roman" panose="02020603050405020304" pitchFamily="18" charset="0"/>
                 <a:cs typeface="Times New Roman" panose="02020603050405020304" pitchFamily="18" charset="0"/>
               </a:rPr>
               <a:t>Certificamos que </a:t>
             </a:r>
             <a:r>
-              <a:rPr lang="pt-BR" sz="1600" dirty="0">
+              <a:rPr lang="pt-BR" sz="1400" b="1" dirty="0">
                 <a:latin typeface="Times New Roman" panose="02020603050405020304" pitchFamily="18" charset="0"/>
                 <a:cs typeface="Times New Roman" panose="02020603050405020304" pitchFamily="18" charset="0"/>
               </a:rPr>
-              <a:t>{{NOME}}</a:t>
-            </a:r>
-            <a:r>
-              <a:rPr lang="pt-BR" altLang="ko-KR" sz="1403" dirty="0">
+              <a:t>{{NOME}} {{CARGO}}</a:t>
+            </a:r>
+            <a:r>
+              <a:rPr lang="pt-BR" sz="1400" b="1" dirty="0">
+                <a:solidFill>
+                  <a:srgbClr val="2D273D"/>
+                </a:solidFill>
+                <a:latin typeface="Times New Roman" panose="02020603050405020304" pitchFamily="18" charset="0"/>
+                <a:cs typeface="Times New Roman" panose="02020603050405020304" pitchFamily="18" charset="0"/>
+                <a:sym typeface="+mn-lt"/>
+              </a:rPr>
+              <a:t> </a:t>
+            </a:r>
+            <a:r>
+              <a:rPr lang="pt-BR" altLang="ko-KR" sz="1400" b="1" dirty="0">
                 <a:latin typeface="Times New Roman" panose="02020603050405020304" pitchFamily="18" charset="0"/>
                 <a:cs typeface="Times New Roman" panose="02020603050405020304" pitchFamily="18" charset="0"/>
               </a:rPr>
-              <a:t>, portador do CPF </a:t>
-            </a:r>
-            <a:r>
-              <a:rPr lang="pt-BR" sz="1600" dirty="0">
+              <a:t>,  portador do CPF </a:t>
+            </a:r>
+            <a:r>
+              <a:rPr lang="pt-BR" sz="1400" b="1" dirty="0">
                 <a:latin typeface="Times New Roman" panose="02020603050405020304" pitchFamily="18" charset="0"/>
                 <a:cs typeface="Times New Roman" panose="02020603050405020304" pitchFamily="18" charset="0"/>
               </a:rPr>
               <a:t>{{CPF}}</a:t>
             </a:r>
             <a:r>
-              <a:rPr lang="pt-BR" altLang="ko-KR" sz="1403" dirty="0">
+              <a:rPr lang="pt-BR" altLang="ko-KR" sz="1400" b="1" dirty="0">
                 <a:latin typeface="Times New Roman" panose="02020603050405020304" pitchFamily="18" charset="0"/>
                 <a:cs typeface="Times New Roman" panose="02020603050405020304" pitchFamily="18" charset="0"/>
               </a:rPr>
               <a:t> concluiu com aproveitamento satisfatório o </a:t>
             </a:r>
             <a:r>
-              <a:rPr lang="pt-BR" sz="1200" dirty="0">
+              <a:rPr lang="pt-BR" sz="1400" b="1" dirty="0">
                 <a:latin typeface="Times New Roman" panose="02020603050405020304" pitchFamily="18" charset="0"/>
                 <a:cs typeface="Times New Roman" panose="02020603050405020304" pitchFamily="18" charset="0"/>
               </a:rPr>
@@ -3841,88 +3856,46 @@
           <a:p>
             <a:pPr algn="r"/>
             <a:r>
-              <a:rPr lang="pt-BR" sz="1200" dirty="0">
+              <a:rPr lang="pt-BR" sz="1400" b="1" dirty="0">
                 <a:latin typeface="Times New Roman" panose="02020603050405020304" pitchFamily="18" charset="0"/>
                 <a:cs typeface="Times New Roman" panose="02020603050405020304" pitchFamily="18" charset="0"/>
               </a:rPr>
               <a:t>do</a:t>
             </a:r>
             <a:r>
-              <a:rPr lang="pt-BR" altLang="ko-KR" sz="1200" dirty="0">
+              <a:rPr lang="pt-BR" altLang="ko-KR" sz="1400" b="1" dirty="0">
                 <a:latin typeface="Times New Roman" panose="02020603050405020304" pitchFamily="18" charset="0"/>
                 <a:cs typeface="Times New Roman" panose="02020603050405020304" pitchFamily="18" charset="0"/>
               </a:rPr>
-              <a:t> </a:t>
-            </a:r>
-            <a:r>
-              <a:rPr lang="pt-BR" altLang="ko-KR" sz="1403" b="1" dirty="0">
-                <a:latin typeface="Times New Roman" panose="02020603050405020304" pitchFamily="18" charset="0"/>
-                <a:cs typeface="Times New Roman" panose="02020603050405020304" pitchFamily="18" charset="0"/>
-              </a:rPr>
-              <a:t>Curso sobre uso e guarda de EPI</a:t>
-            </a:r>
-            <a:r>
-              <a:rPr lang="pt-BR" altLang="ko-KR" sz="1403" dirty="0">
-                <a:latin typeface="Times New Roman" panose="02020603050405020304" pitchFamily="18" charset="0"/>
-                <a:cs typeface="Times New Roman" panose="02020603050405020304" pitchFamily="18" charset="0"/>
-              </a:rPr>
-              <a:t>, promovido nas dependências da empresa ALTA TELAS REDES DE PROTEÇÃO – </a:t>
-            </a:r>
-            <a:r>
-              <a:rPr lang="pt-BR" sz="1200" dirty="0">
+              <a:t> Curso sobre uso e guarda de EPI, promovido nas dependências da empresa ALTA TELAS REDES DE PROTEÇÃO – </a:t>
+            </a:r>
+            <a:r>
+              <a:rPr lang="pt-BR" sz="1400" b="1" dirty="0">
                 <a:latin typeface="Times New Roman" panose="02020603050405020304" pitchFamily="18" charset="0"/>
                 <a:cs typeface="Times New Roman" panose="02020603050405020304" pitchFamily="18" charset="0"/>
               </a:rPr>
               <a:t>R. Gonçalves e Clarinda </a:t>
             </a:r>
             <a:r>
-              <a:rPr lang="pt-BR" sz="1200" dirty="0" err="1">
+              <a:rPr lang="pt-BR" sz="1400" b="1" dirty="0" err="1">
                 <a:latin typeface="Times New Roman" panose="02020603050405020304" pitchFamily="18" charset="0"/>
                 <a:cs typeface="Times New Roman" panose="02020603050405020304" pitchFamily="18" charset="0"/>
               </a:rPr>
               <a:t>Limiro</a:t>
             </a:r>
             <a:r>
-              <a:rPr lang="pt-BR" sz="1200" dirty="0">
+              <a:rPr lang="pt-BR" sz="1400" b="1" dirty="0">
                 <a:latin typeface="Times New Roman" panose="02020603050405020304" pitchFamily="18" charset="0"/>
                 <a:cs typeface="Times New Roman" panose="02020603050405020304" pitchFamily="18" charset="0"/>
               </a:rPr>
-              <a:t>, </a:t>
-            </a:r>
-            <a:r>
-              <a:rPr lang="pt-BR" sz="1200">
+              <a:t>, 115 , Ribeirão Preto - SP, 14063-172 </a:t>
+            </a:r>
+            <a:r>
+              <a:rPr lang="pt-BR" altLang="ko-KR" sz="1400" b="1" dirty="0">
                 <a:latin typeface="Times New Roman" panose="02020603050405020304" pitchFamily="18" charset="0"/>
                 <a:cs typeface="Times New Roman" panose="02020603050405020304" pitchFamily="18" charset="0"/>
               </a:rPr>
-              <a:t>115 , Ribeirão </a:t>
-            </a:r>
-            <a:r>
-              <a:rPr lang="pt-BR" sz="1200" dirty="0">
-                <a:latin typeface="Times New Roman" panose="02020603050405020304" pitchFamily="18" charset="0"/>
-                <a:cs typeface="Times New Roman" panose="02020603050405020304" pitchFamily="18" charset="0"/>
-              </a:rPr>
-              <a:t>Preto - SP, 14063-172 </a:t>
-            </a:r>
-            <a:r>
-              <a:rPr lang="pt-BR" altLang="ko-KR" sz="1403" dirty="0">
-                <a:latin typeface="Times New Roman" panose="02020603050405020304" pitchFamily="18" charset="0"/>
-                <a:cs typeface="Times New Roman" panose="02020603050405020304" pitchFamily="18" charset="0"/>
-              </a:rPr>
-              <a:t>no dia {{DATA}}, conforme exigências da Norma Regulamentadora - NR 06, com carga horária de </a:t>
-            </a:r>
-            <a:r>
-              <a:rPr lang="pt-BR" altLang="ko-KR" sz="1403" b="1" dirty="0">
-                <a:latin typeface="Times New Roman" panose="02020603050405020304" pitchFamily="18" charset="0"/>
-                <a:cs typeface="Times New Roman" panose="02020603050405020304" pitchFamily="18" charset="0"/>
-              </a:rPr>
-              <a:t>04 horas</a:t>
-            </a:r>
-            <a:r>
-              <a:rPr lang="pt-BR" altLang="ko-KR" sz="1403" dirty="0">
-                <a:latin typeface="Times New Roman" panose="02020603050405020304" pitchFamily="18" charset="0"/>
-                <a:cs typeface="Times New Roman" panose="02020603050405020304" pitchFamily="18" charset="0"/>
-              </a:rPr>
-              <a:t>.</a:t>
+              <a:t>no dia {{DATA}}, conforme exigências da Norma Regulamentadora - NR 06, com carga horária de 04 horas.</a:t>
             </a:r>
           </a:p>
         </p:txBody>
@@ -4683,7 +4656,7 @@
         </p:nvSpPr>
         <p:spPr>
           <a:xfrm>
-            <a:off x="5260369" y="2526573"/>
+            <a:off x="5345906" y="1382151"/>
             <a:ext cx="4817987" cy="578172"/>
           </a:xfrm>
           <a:prstGeom prst="rect">
@@ -4890,7 +4863,7 @@
         </p:nvSpPr>
         <p:spPr>
           <a:xfrm>
-            <a:off x="770197" y="6955343"/>
+            <a:off x="5042300" y="2281800"/>
             <a:ext cx="5419618" cy="276999"/>
           </a:xfrm>
           <a:prstGeom prst="rect">
@@ -4906,14 +4879,18 @@
           <a:p>
             <a:pPr algn="ctr"/>
             <a:r>
-              <a:rPr lang="pt-BR" sz="1200" dirty="0"/>
+              <a:rPr lang="pt-BR" sz="1200" b="1" dirty="0">
+                <a:latin typeface="Times New Roman" panose="02020603050405020304" pitchFamily="18" charset="0"/>
+                <a:cs typeface="Times New Roman" panose="02020603050405020304" pitchFamily="18" charset="0"/>
+              </a:rPr>
               <a:t>{{CARGO}}</a:t>
             </a:r>
             <a:endParaRPr lang="pt-BR" altLang="zh-CN" sz="1200" b="1" dirty="0">
               <a:solidFill>
                 <a:srgbClr val="2D273D"/>
               </a:solidFill>
-              <a:cs typeface="+mn-ea"/>
+              <a:latin typeface="Times New Roman" panose="02020603050405020304" pitchFamily="18" charset="0"/>
+              <a:cs typeface="Times New Roman" panose="02020603050405020304" pitchFamily="18" charset="0"/>
               <a:sym typeface="+mn-lt"/>
             </a:endParaRPr>
           </a:p>

</xml_diff>

<commit_message>
fix: Corrigir erro de caracteres especiais na geração de certificados
- Corrigir grafia para 'Inicial/Admissional' e usar valores seguros para arquivo
- Adicionar limpeza de caracteres especiais (/, \, :, *, ?, etc.) nos nomes de arquivo
- Implementar mapeamento entre códigos de arquivo e textos de exibição
- Atualizar templates gerar_unitario.html e gerar_lote.html com novos valores
- Garantir que '/' em 'Inicial/Admissional' seja convertido para '_' nos arquivos
- Manter texto original nos certificados para exibição correta
- Adicionar teste_certificados.py para validar as correções
- Resolver erro: [Errno 2] No such file or directory com caracteres especiais
</commit_message>
<xml_diff>
--- a/modelos_nr/NR06_modelo.pptx
+++ b/modelos_nr/NR06_modelo.pptx
@@ -252,7 +252,7 @@
           <a:p>
             <a:fld id="{A3B7E9CD-3D34-47C6-98EC-7A5BB634A5D7}" type="datetimeFigureOut">
               <a:rPr lang="pt-BR" smtClean="0"/>
-              <a:t>29/06/2025</a:t>
+              <a:t>05/07/2025</a:t>
             </a:fld>
             <a:endParaRPr lang="pt-BR"/>
           </a:p>
@@ -422,7 +422,7 @@
           <a:p>
             <a:fld id="{A3B7E9CD-3D34-47C6-98EC-7A5BB634A5D7}" type="datetimeFigureOut">
               <a:rPr lang="pt-BR" smtClean="0"/>
-              <a:t>29/06/2025</a:t>
+              <a:t>05/07/2025</a:t>
             </a:fld>
             <a:endParaRPr lang="pt-BR"/>
           </a:p>
@@ -602,7 +602,7 @@
           <a:p>
             <a:fld id="{A3B7E9CD-3D34-47C6-98EC-7A5BB634A5D7}" type="datetimeFigureOut">
               <a:rPr lang="pt-BR" smtClean="0"/>
-              <a:t>29/06/2025</a:t>
+              <a:t>05/07/2025</a:t>
             </a:fld>
             <a:endParaRPr lang="pt-BR"/>
           </a:p>
@@ -772,7 +772,7 @@
           <a:p>
             <a:fld id="{A3B7E9CD-3D34-47C6-98EC-7A5BB634A5D7}" type="datetimeFigureOut">
               <a:rPr lang="pt-BR" smtClean="0"/>
-              <a:t>29/06/2025</a:t>
+              <a:t>05/07/2025</a:t>
             </a:fld>
             <a:endParaRPr lang="pt-BR"/>
           </a:p>
@@ -1016,7 +1016,7 @@
           <a:p>
             <a:fld id="{A3B7E9CD-3D34-47C6-98EC-7A5BB634A5D7}" type="datetimeFigureOut">
               <a:rPr lang="pt-BR" smtClean="0"/>
-              <a:t>29/06/2025</a:t>
+              <a:t>05/07/2025</a:t>
             </a:fld>
             <a:endParaRPr lang="pt-BR"/>
           </a:p>
@@ -1248,7 +1248,7 @@
           <a:p>
             <a:fld id="{A3B7E9CD-3D34-47C6-98EC-7A5BB634A5D7}" type="datetimeFigureOut">
               <a:rPr lang="pt-BR" smtClean="0"/>
-              <a:t>29/06/2025</a:t>
+              <a:t>05/07/2025</a:t>
             </a:fld>
             <a:endParaRPr lang="pt-BR"/>
           </a:p>
@@ -1615,7 +1615,7 @@
           <a:p>
             <a:fld id="{A3B7E9CD-3D34-47C6-98EC-7A5BB634A5D7}" type="datetimeFigureOut">
               <a:rPr lang="pt-BR" smtClean="0"/>
-              <a:t>29/06/2025</a:t>
+              <a:t>05/07/2025</a:t>
             </a:fld>
             <a:endParaRPr lang="pt-BR"/>
           </a:p>
@@ -1733,7 +1733,7 @@
           <a:p>
             <a:fld id="{A3B7E9CD-3D34-47C6-98EC-7A5BB634A5D7}" type="datetimeFigureOut">
               <a:rPr lang="pt-BR" smtClean="0"/>
-              <a:t>29/06/2025</a:t>
+              <a:t>05/07/2025</a:t>
             </a:fld>
             <a:endParaRPr lang="pt-BR"/>
           </a:p>
@@ -1828,7 +1828,7 @@
           <a:p>
             <a:fld id="{A3B7E9CD-3D34-47C6-98EC-7A5BB634A5D7}" type="datetimeFigureOut">
               <a:rPr lang="pt-BR" smtClean="0"/>
-              <a:t>29/06/2025</a:t>
+              <a:t>05/07/2025</a:t>
             </a:fld>
             <a:endParaRPr lang="pt-BR"/>
           </a:p>
@@ -2105,7 +2105,7 @@
           <a:p>
             <a:fld id="{A3B7E9CD-3D34-47C6-98EC-7A5BB634A5D7}" type="datetimeFigureOut">
               <a:rPr lang="pt-BR" smtClean="0"/>
-              <a:t>29/06/2025</a:t>
+              <a:t>05/07/2025</a:t>
             </a:fld>
             <a:endParaRPr lang="pt-BR"/>
           </a:p>
@@ -2362,7 +2362,7 @@
           <a:p>
             <a:fld id="{A3B7E9CD-3D34-47C6-98EC-7A5BB634A5D7}" type="datetimeFigureOut">
               <a:rPr lang="pt-BR" smtClean="0"/>
-              <a:t>29/06/2025</a:t>
+              <a:t>05/07/2025</a:t>
             </a:fld>
             <a:endParaRPr lang="pt-BR"/>
           </a:p>
@@ -2575,7 +2575,7 @@
           <a:p>
             <a:fld id="{A3B7E9CD-3D34-47C6-98EC-7A5BB634A5D7}" type="datetimeFigureOut">
               <a:rPr lang="pt-BR" smtClean="0"/>
-              <a:t>29/06/2025</a:t>
+              <a:t>05/07/2025</a:t>
             </a:fld>
             <a:endParaRPr lang="pt-BR"/>
           </a:p>
@@ -3784,8 +3784,8 @@
         </p:nvSpPr>
         <p:spPr>
           <a:xfrm>
-            <a:off x="2914650" y="3827677"/>
-            <a:ext cx="7025938" cy="1384995"/>
+            <a:off x="2914650" y="3735345"/>
+            <a:ext cx="7025938" cy="1569660"/>
           </a:xfrm>
           <a:prstGeom prst="rect">
             <a:avLst/>
@@ -3798,23 +3798,22 @@
           </a:bodyPr>
           <a:lstStyle/>
           <a:p>
-            <a:pPr algn="r"/>
-            <a:r>
-              <a:rPr lang="pt-BR" altLang="ko-KR" sz="1400" b="1" dirty="0">
+            <a:r>
+              <a:rPr lang="pt-BR" altLang="ko-KR" sz="1600" b="1" dirty="0">
                 <a:latin typeface="Times New Roman" panose="02020603050405020304" pitchFamily="18" charset="0"/>
                 <a:cs typeface="Times New Roman" panose="02020603050405020304" pitchFamily="18" charset="0"/>
               </a:rPr>
               <a:t>Certificamos que </a:t>
             </a:r>
             <a:r>
-              <a:rPr lang="pt-BR" sz="1400" b="1" dirty="0">
+              <a:rPr lang="pt-BR" sz="1600" b="1" dirty="0">
                 <a:latin typeface="Times New Roman" panose="02020603050405020304" pitchFamily="18" charset="0"/>
                 <a:cs typeface="Times New Roman" panose="02020603050405020304" pitchFamily="18" charset="0"/>
               </a:rPr>
               <a:t>{{NOME}} {{CARGO}}</a:t>
             </a:r>
             <a:r>
-              <a:rPr lang="pt-BR" sz="1400" b="1" dirty="0">
+              <a:rPr lang="pt-BR" sz="1600" b="1" dirty="0">
                 <a:solidFill>
                   <a:srgbClr val="2D273D"/>
                 </a:solidFill>
@@ -3825,28 +3824,28 @@
               <a:t> </a:t>
             </a:r>
             <a:r>
-              <a:rPr lang="pt-BR" altLang="ko-KR" sz="1400" b="1" dirty="0">
+              <a:rPr lang="pt-BR" altLang="ko-KR" sz="1600" b="1" dirty="0">
                 <a:latin typeface="Times New Roman" panose="02020603050405020304" pitchFamily="18" charset="0"/>
                 <a:cs typeface="Times New Roman" panose="02020603050405020304" pitchFamily="18" charset="0"/>
               </a:rPr>
               <a:t>,  portador do CPF </a:t>
             </a:r>
             <a:r>
-              <a:rPr lang="pt-BR" sz="1400" b="1" dirty="0">
+              <a:rPr lang="pt-BR" sz="1600" b="1" dirty="0">
                 <a:latin typeface="Times New Roman" panose="02020603050405020304" pitchFamily="18" charset="0"/>
                 <a:cs typeface="Times New Roman" panose="02020603050405020304" pitchFamily="18" charset="0"/>
               </a:rPr>
               <a:t>{{CPF}}</a:t>
             </a:r>
             <a:r>
-              <a:rPr lang="pt-BR" altLang="ko-KR" sz="1400" b="1" dirty="0">
+              <a:rPr lang="pt-BR" altLang="ko-KR" sz="1600" b="1" dirty="0">
                 <a:latin typeface="Times New Roman" panose="02020603050405020304" pitchFamily="18" charset="0"/>
                 <a:cs typeface="Times New Roman" panose="02020603050405020304" pitchFamily="18" charset="0"/>
               </a:rPr>
               <a:t> concluiu com aproveitamento satisfatório o </a:t>
             </a:r>
             <a:r>
-              <a:rPr lang="pt-BR" sz="1400" b="1" dirty="0">
+              <a:rPr lang="pt-BR" sz="1600" b="1" dirty="0">
                 <a:latin typeface="Times New Roman" panose="02020603050405020304" pitchFamily="18" charset="0"/>
                 <a:cs typeface="Times New Roman" panose="02020603050405020304" pitchFamily="18" charset="0"/>
               </a:rPr>
@@ -3854,44 +3853,43 @@
             </a:r>
           </a:p>
           <a:p>
-            <a:pPr algn="r"/>
-            <a:r>
-              <a:rPr lang="pt-BR" sz="1400" b="1" dirty="0">
+            <a:r>
+              <a:rPr lang="pt-BR" sz="1600" b="1" dirty="0">
                 <a:latin typeface="Times New Roman" panose="02020603050405020304" pitchFamily="18" charset="0"/>
                 <a:cs typeface="Times New Roman" panose="02020603050405020304" pitchFamily="18" charset="0"/>
               </a:rPr>
               <a:t>do</a:t>
             </a:r>
             <a:r>
-              <a:rPr lang="pt-BR" altLang="ko-KR" sz="1400" b="1" dirty="0">
+              <a:rPr lang="pt-BR" altLang="ko-KR" sz="1600" b="1" dirty="0">
                 <a:latin typeface="Times New Roman" panose="02020603050405020304" pitchFamily="18" charset="0"/>
                 <a:cs typeface="Times New Roman" panose="02020603050405020304" pitchFamily="18" charset="0"/>
               </a:rPr>
               <a:t> Curso sobre uso e guarda de EPI, promovido nas dependências da empresa ALTA TELAS REDES DE PROTEÇÃO – </a:t>
             </a:r>
             <a:r>
-              <a:rPr lang="pt-BR" sz="1400" b="1" dirty="0">
+              <a:rPr lang="pt-BR" sz="1600" b="1" dirty="0">
                 <a:latin typeface="Times New Roman" panose="02020603050405020304" pitchFamily="18" charset="0"/>
                 <a:cs typeface="Times New Roman" panose="02020603050405020304" pitchFamily="18" charset="0"/>
               </a:rPr>
               <a:t>R. Gonçalves e Clarinda </a:t>
             </a:r>
             <a:r>
-              <a:rPr lang="pt-BR" sz="1400" b="1" dirty="0" err="1">
+              <a:rPr lang="pt-BR" sz="1600" b="1" dirty="0" err="1">
                 <a:latin typeface="Times New Roman" panose="02020603050405020304" pitchFamily="18" charset="0"/>
                 <a:cs typeface="Times New Roman" panose="02020603050405020304" pitchFamily="18" charset="0"/>
               </a:rPr>
               <a:t>Limiro</a:t>
             </a:r>
             <a:r>
-              <a:rPr lang="pt-BR" sz="1400" b="1" dirty="0">
+              <a:rPr lang="pt-BR" sz="1600" b="1" dirty="0">
                 <a:latin typeface="Times New Roman" panose="02020603050405020304" pitchFamily="18" charset="0"/>
                 <a:cs typeface="Times New Roman" panose="02020603050405020304" pitchFamily="18" charset="0"/>
               </a:rPr>
               <a:t>, 115 , Ribeirão Preto - SP, 14063-172 </a:t>
             </a:r>
             <a:r>
-              <a:rPr lang="pt-BR" altLang="ko-KR" sz="1400" b="1" dirty="0">
+              <a:rPr lang="pt-BR" altLang="ko-KR" sz="1600" b="1" dirty="0">
                 <a:latin typeface="Times New Roman" panose="02020603050405020304" pitchFamily="18" charset="0"/>
                 <a:cs typeface="Times New Roman" panose="02020603050405020304" pitchFamily="18" charset="0"/>
               </a:rPr>
@@ -4788,114 +4786,6 @@
           </a:prstGeom>
         </p:spPr>
       </p:pic>
-      <p:pic>
-        <p:nvPicPr>
-          <p:cNvPr id="6" name="Imagem 5">
-            <a:extLst>
-              <a:ext uri="{FF2B5EF4-FFF2-40B4-BE49-F238E27FC236}">
-                <a16:creationId xmlns:a16="http://schemas.microsoft.com/office/drawing/2014/main" id="{D9E81F4F-3DC0-87F9-24FB-0DADC80B5094}"/>
-              </a:ext>
-            </a:extLst>
-          </p:cNvPr>
-          <p:cNvPicPr>
-            <a:picLocks noChangeAspect="1"/>
-          </p:cNvPicPr>
-          <p:nvPr/>
-        </p:nvPicPr>
-        <p:blipFill>
-          <a:blip r:embed="rId5">
-            <a:clrChange>
-              <a:clrFrom>
-                <a:srgbClr val="FFFFFF"/>
-              </a:clrFrom>
-              <a:clrTo>
-                <a:srgbClr val="FFFFFF">
-                  <a:alpha val="0"/>
-                </a:srgbClr>
-              </a:clrTo>
-            </a:clrChange>
-            <a:duotone>
-              <a:prstClr val="black"/>
-              <a:schemeClr val="accent1">
-                <a:tint val="45000"/>
-                <a:satMod val="400000"/>
-              </a:schemeClr>
-            </a:duotone>
-            <a:extLst>
-              <a:ext uri="{BEBA8EAE-BF5A-486C-A8C5-ECC9F3942E4B}">
-                <a14:imgProps xmlns:a14="http://schemas.microsoft.com/office/drawing/2010/main">
-                  <a14:imgLayer r:embed="rId6">
-                    <a14:imgEffect>
-                      <a14:sharpenSoften amount="50000"/>
-                    </a14:imgEffect>
-                    <a14:imgEffect>
-                      <a14:brightnessContrast bright="40000" contrast="-40000"/>
-                    </a14:imgEffect>
-                  </a14:imgLayer>
-                </a14:imgProps>
-              </a:ext>
-            </a:extLst>
-          </a:blip>
-          <a:srcRect l="7998" t="17014" r="33668" b="13724"/>
-          <a:stretch/>
-        </p:blipFill>
-        <p:spPr>
-          <a:xfrm rot="16200000">
-            <a:off x="7753576" y="5494066"/>
-            <a:ext cx="412391" cy="1609910"/>
-          </a:xfrm>
-          <a:prstGeom prst="rect">
-            <a:avLst/>
-          </a:prstGeom>
-        </p:spPr>
-      </p:pic>
-      <p:sp>
-        <p:nvSpPr>
-          <p:cNvPr id="9" name="CaixaDeTexto 8">
-            <a:extLst>
-              <a:ext uri="{FF2B5EF4-FFF2-40B4-BE49-F238E27FC236}">
-                <a16:creationId xmlns:a16="http://schemas.microsoft.com/office/drawing/2014/main" id="{DA6897DA-DE16-6885-8B54-ACB1A2AA7B36}"/>
-              </a:ext>
-            </a:extLst>
-          </p:cNvPr>
-          <p:cNvSpPr txBox="1"/>
-          <p:nvPr/>
-        </p:nvSpPr>
-        <p:spPr>
-          <a:xfrm>
-            <a:off x="5042300" y="2281800"/>
-            <a:ext cx="5419618" cy="276999"/>
-          </a:xfrm>
-          <a:prstGeom prst="rect">
-            <a:avLst/>
-          </a:prstGeom>
-          <a:noFill/>
-        </p:spPr>
-        <p:txBody>
-          <a:bodyPr wrap="square">
-            <a:spAutoFit/>
-          </a:bodyPr>
-          <a:lstStyle/>
-          <a:p>
-            <a:pPr algn="ctr"/>
-            <a:r>
-              <a:rPr lang="pt-BR" sz="1200" b="1" dirty="0">
-                <a:latin typeface="Times New Roman" panose="02020603050405020304" pitchFamily="18" charset="0"/>
-                <a:cs typeface="Times New Roman" panose="02020603050405020304" pitchFamily="18" charset="0"/>
-              </a:rPr>
-              <a:t>{{CARGO}}</a:t>
-            </a:r>
-            <a:endParaRPr lang="pt-BR" altLang="zh-CN" sz="1200" b="1" dirty="0">
-              <a:solidFill>
-                <a:srgbClr val="2D273D"/>
-              </a:solidFill>
-              <a:latin typeface="Times New Roman" panose="02020603050405020304" pitchFamily="18" charset="0"/>
-              <a:cs typeface="Times New Roman" panose="02020603050405020304" pitchFamily="18" charset="0"/>
-              <a:sym typeface="+mn-lt"/>
-            </a:endParaRPr>
-          </a:p>
-        </p:txBody>
-      </p:sp>
     </p:spTree>
     <p:extLst>
       <p:ext uri="{BB962C8B-B14F-4D97-AF65-F5344CB8AC3E}">

</xml_diff>

<commit_message>
Atualização: sistema de geração de certificados em PDF com alta qualidade e ajustes NR01
</commit_message>
<xml_diff>
--- a/modelos_nr/NR06_modelo.pptx
+++ b/modelos_nr/NR06_modelo.pptx
@@ -252,7 +252,7 @@
           <a:p>
             <a:fld id="{A3B7E9CD-3D34-47C6-98EC-7A5BB634A5D7}" type="datetimeFigureOut">
               <a:rPr lang="pt-BR" smtClean="0"/>
-              <a:t>05/07/2025</a:t>
+              <a:t>05/08/2025</a:t>
             </a:fld>
             <a:endParaRPr lang="pt-BR"/>
           </a:p>
@@ -422,7 +422,7 @@
           <a:p>
             <a:fld id="{A3B7E9CD-3D34-47C6-98EC-7A5BB634A5D7}" type="datetimeFigureOut">
               <a:rPr lang="pt-BR" smtClean="0"/>
-              <a:t>05/07/2025</a:t>
+              <a:t>05/08/2025</a:t>
             </a:fld>
             <a:endParaRPr lang="pt-BR"/>
           </a:p>
@@ -602,7 +602,7 @@
           <a:p>
             <a:fld id="{A3B7E9CD-3D34-47C6-98EC-7A5BB634A5D7}" type="datetimeFigureOut">
               <a:rPr lang="pt-BR" smtClean="0"/>
-              <a:t>05/07/2025</a:t>
+              <a:t>05/08/2025</a:t>
             </a:fld>
             <a:endParaRPr lang="pt-BR"/>
           </a:p>
@@ -772,7 +772,7 @@
           <a:p>
             <a:fld id="{A3B7E9CD-3D34-47C6-98EC-7A5BB634A5D7}" type="datetimeFigureOut">
               <a:rPr lang="pt-BR" smtClean="0"/>
-              <a:t>05/07/2025</a:t>
+              <a:t>05/08/2025</a:t>
             </a:fld>
             <a:endParaRPr lang="pt-BR"/>
           </a:p>
@@ -1016,7 +1016,7 @@
           <a:p>
             <a:fld id="{A3B7E9CD-3D34-47C6-98EC-7A5BB634A5D7}" type="datetimeFigureOut">
               <a:rPr lang="pt-BR" smtClean="0"/>
-              <a:t>05/07/2025</a:t>
+              <a:t>05/08/2025</a:t>
             </a:fld>
             <a:endParaRPr lang="pt-BR"/>
           </a:p>
@@ -1248,7 +1248,7 @@
           <a:p>
             <a:fld id="{A3B7E9CD-3D34-47C6-98EC-7A5BB634A5D7}" type="datetimeFigureOut">
               <a:rPr lang="pt-BR" smtClean="0"/>
-              <a:t>05/07/2025</a:t>
+              <a:t>05/08/2025</a:t>
             </a:fld>
             <a:endParaRPr lang="pt-BR"/>
           </a:p>
@@ -1615,7 +1615,7 @@
           <a:p>
             <a:fld id="{A3B7E9CD-3D34-47C6-98EC-7A5BB634A5D7}" type="datetimeFigureOut">
               <a:rPr lang="pt-BR" smtClean="0"/>
-              <a:t>05/07/2025</a:t>
+              <a:t>05/08/2025</a:t>
             </a:fld>
             <a:endParaRPr lang="pt-BR"/>
           </a:p>
@@ -1733,7 +1733,7 @@
           <a:p>
             <a:fld id="{A3B7E9CD-3D34-47C6-98EC-7A5BB634A5D7}" type="datetimeFigureOut">
               <a:rPr lang="pt-BR" smtClean="0"/>
-              <a:t>05/07/2025</a:t>
+              <a:t>05/08/2025</a:t>
             </a:fld>
             <a:endParaRPr lang="pt-BR"/>
           </a:p>
@@ -1828,7 +1828,7 @@
           <a:p>
             <a:fld id="{A3B7E9CD-3D34-47C6-98EC-7A5BB634A5D7}" type="datetimeFigureOut">
               <a:rPr lang="pt-BR" smtClean="0"/>
-              <a:t>05/07/2025</a:t>
+              <a:t>05/08/2025</a:t>
             </a:fld>
             <a:endParaRPr lang="pt-BR"/>
           </a:p>
@@ -2105,7 +2105,7 @@
           <a:p>
             <a:fld id="{A3B7E9CD-3D34-47C6-98EC-7A5BB634A5D7}" type="datetimeFigureOut">
               <a:rPr lang="pt-BR" smtClean="0"/>
-              <a:t>05/07/2025</a:t>
+              <a:t>05/08/2025</a:t>
             </a:fld>
             <a:endParaRPr lang="pt-BR"/>
           </a:p>
@@ -2362,7 +2362,7 @@
           <a:p>
             <a:fld id="{A3B7E9CD-3D34-47C6-98EC-7A5BB634A5D7}" type="datetimeFigureOut">
               <a:rPr lang="pt-BR" smtClean="0"/>
-              <a:t>05/07/2025</a:t>
+              <a:t>05/08/2025</a:t>
             </a:fld>
             <a:endParaRPr lang="pt-BR"/>
           </a:p>
@@ -2575,7 +2575,7 @@
           <a:p>
             <a:fld id="{A3B7E9CD-3D34-47C6-98EC-7A5BB634A5D7}" type="datetimeFigureOut">
               <a:rPr lang="pt-BR" smtClean="0"/>
-              <a:t>05/07/2025</a:t>
+              <a:t>05/08/2025</a:t>
             </a:fld>
             <a:endParaRPr lang="pt-BR"/>
           </a:p>
@@ -3445,85 +3445,6 @@
       </p:grpSp>
       <p:sp>
         <p:nvSpPr>
-          <p:cNvPr id="36" name="矩形 30">
-            <a:extLst>
-              <a:ext uri="{FF2B5EF4-FFF2-40B4-BE49-F238E27FC236}">
-                <a16:creationId xmlns:a16="http://schemas.microsoft.com/office/drawing/2014/main" id="{9798F945-E63C-1AE0-9EAE-97F364ACCD61}"/>
-              </a:ext>
-            </a:extLst>
-          </p:cNvPr>
-          <p:cNvSpPr/>
-          <p:nvPr/>
-        </p:nvSpPr>
-        <p:spPr>
-          <a:xfrm>
-            <a:off x="2630966" y="6590627"/>
-            <a:ext cx="1811328" cy="307777"/>
-          </a:xfrm>
-          <a:prstGeom prst="rect">
-            <a:avLst/>
-          </a:prstGeom>
-          <a:noFill/>
-          <a:ln>
-            <a:noFill/>
-          </a:ln>
-          <a:effectLst/>
-          <a:extLst>
-            <a:ext uri="{909E8E84-426E-40DD-AFC4-6F175D3DCCD1}">
-              <a14:hiddenFill xmlns:a14="http://schemas.microsoft.com/office/drawing/2010/main">
-                <a:solidFill>
-                  <a:schemeClr val="accent1"/>
-                </a:solidFill>
-              </a14:hiddenFill>
-            </a:ext>
-            <a:ext uri="{91240B29-F687-4F45-9708-019B960494DF}">
-              <a14:hiddenLine xmlns:a14="http://schemas.microsoft.com/office/drawing/2010/main" w="9525">
-                <a:solidFill>
-                  <a:schemeClr val="tx1"/>
-                </a:solidFill>
-                <a:miter lim="800000"/>
-                <a:headEnd/>
-                <a:tailEnd/>
-              </a14:hiddenLine>
-            </a:ext>
-            <a:ext uri="{AF507438-7753-43E0-B8FC-AC1667EBCBE1}">
-              <a14:hiddenEffects xmlns:a14="http://schemas.microsoft.com/office/drawing/2010/main">
-                <a:effectLst>
-                  <a:outerShdw dist="35921" dir="2700000" algn="ctr" rotWithShape="0">
-                    <a:schemeClr val="bg2"/>
-                  </a:outerShdw>
-                </a:effectLst>
-              </a14:hiddenEffects>
-            </a:ext>
-          </a:extLst>
-        </p:spPr>
-        <p:txBody>
-          <a:bodyPr wrap="square">
-            <a:spAutoFit/>
-          </a:bodyPr>
-          <a:lstStyle/>
-          <a:p>
-            <a:pPr algn="ctr"/>
-            <a:r>
-              <a:rPr lang="pt-BR" sz="1400" dirty="0">
-                <a:latin typeface="Times New Roman" panose="02020603050405020304" pitchFamily="18" charset="0"/>
-                <a:cs typeface="Times New Roman" panose="02020603050405020304" pitchFamily="18" charset="0"/>
-              </a:rPr>
-              <a:t>{{NOME}}</a:t>
-            </a:r>
-            <a:endParaRPr lang="pt-BR" altLang="zh-CN" sz="1228" b="1" dirty="0">
-              <a:solidFill>
-                <a:srgbClr val="2D273D"/>
-              </a:solidFill>
-              <a:latin typeface="Times New Roman" panose="02020603050405020304" pitchFamily="18" charset="0"/>
-              <a:cs typeface="Times New Roman" panose="02020603050405020304" pitchFamily="18" charset="0"/>
-              <a:sym typeface="+mn-lt"/>
-            </a:endParaRPr>
-          </a:p>
-        </p:txBody>
-      </p:sp>
-      <p:sp>
-        <p:nvSpPr>
           <p:cNvPr id="37" name="副标题 4">
             <a:extLst>
               <a:ext uri="{FF2B5EF4-FFF2-40B4-BE49-F238E27FC236}">
@@ -3842,14 +3763,28 @@
                 <a:latin typeface="Times New Roman" panose="02020603050405020304" pitchFamily="18" charset="0"/>
                 <a:cs typeface="Times New Roman" panose="02020603050405020304" pitchFamily="18" charset="0"/>
               </a:rPr>
-              <a:t> concluiu com aproveitamento satisfatório o </a:t>
+              <a:t> concluiu com aproveitamento satisfatório </a:t>
+            </a:r>
+            <a:r>
+              <a:rPr lang="pt-BR" altLang="ko-KR" sz="1600" b="1">
+                <a:latin typeface="Times New Roman" panose="02020603050405020304" pitchFamily="18" charset="0"/>
+                <a:cs typeface="Times New Roman" panose="02020603050405020304" pitchFamily="18" charset="0"/>
+              </a:rPr>
+              <a:t>o </a:t>
+            </a:r>
+            <a:r>
+              <a:rPr lang="pt-BR" sz="1600" b="1">
+                <a:latin typeface="Times New Roman" panose="02020603050405020304" pitchFamily="18" charset="0"/>
+                <a:cs typeface="Times New Roman" panose="02020603050405020304" pitchFamily="18" charset="0"/>
+              </a:rPr>
+              <a:t>{{</a:t>
             </a:r>
             <a:r>
               <a:rPr lang="pt-BR" sz="1600" b="1" dirty="0">
                 <a:latin typeface="Times New Roman" panose="02020603050405020304" pitchFamily="18" charset="0"/>
                 <a:cs typeface="Times New Roman" panose="02020603050405020304" pitchFamily="18" charset="0"/>
               </a:rPr>
-              <a:t>Treinamento {{TIPO_TREINAMENTO}}</a:t>
+              <a:t>TIPO_TREINAMENTO}}</a:t>
             </a:r>
           </a:p>
           <a:p>
@@ -4786,6 +4721,61 @@
           </a:prstGeom>
         </p:spPr>
       </p:pic>
+      <p:sp>
+        <p:nvSpPr>
+          <p:cNvPr id="8" name="CaixaDeTexto 7">
+            <a:extLst>
+              <a:ext uri="{FF2B5EF4-FFF2-40B4-BE49-F238E27FC236}">
+                <a16:creationId xmlns:a16="http://schemas.microsoft.com/office/drawing/2014/main" id="{DBD76013-4C1E-12CD-DEEA-9ABC5D2923B4}"/>
+              </a:ext>
+            </a:extLst>
+          </p:cNvPr>
+          <p:cNvSpPr txBox="1"/>
+          <p:nvPr/>
+        </p:nvSpPr>
+        <p:spPr>
+          <a:xfrm>
+            <a:off x="2164718" y="6547300"/>
+            <a:ext cx="5345206" cy="646331"/>
+          </a:xfrm>
+          <a:prstGeom prst="rect">
+            <a:avLst/>
+          </a:prstGeom>
+          <a:noFill/>
+        </p:spPr>
+        <p:txBody>
+          <a:bodyPr wrap="square">
+            <a:spAutoFit/>
+          </a:bodyPr>
+          <a:lstStyle/>
+          <a:p>
+            <a:r>
+              <a:rPr lang="pt-BR" sz="1800" b="1" dirty="0">
+                <a:latin typeface="Times New Roman" panose="02020603050405020304" pitchFamily="18" charset="0"/>
+                <a:cs typeface="Times New Roman" panose="02020603050405020304" pitchFamily="18" charset="0"/>
+              </a:rPr>
+              <a:t>{{NOME}}</a:t>
+            </a:r>
+          </a:p>
+          <a:p>
+            <a:r>
+              <a:rPr lang="pt-BR" altLang="zh-CN" sz="1800" b="1" dirty="0">
+                <a:solidFill>
+                  <a:srgbClr val="2D273D"/>
+                </a:solidFill>
+                <a:latin typeface="Times New Roman" panose="02020603050405020304" pitchFamily="18" charset="0"/>
+                <a:cs typeface="Times New Roman" panose="02020603050405020304" pitchFamily="18" charset="0"/>
+                <a:sym typeface="+mn-lt"/>
+              </a:rPr>
+              <a:t> </a:t>
+            </a:r>
+            <a:endParaRPr lang="pt-BR" sz="1800" b="1" dirty="0">
+              <a:latin typeface="Times New Roman" panose="02020603050405020304" pitchFamily="18" charset="0"/>
+              <a:cs typeface="Times New Roman" panose="02020603050405020304" pitchFamily="18" charset="0"/>
+            </a:endParaRPr>
+          </a:p>
+        </p:txBody>
+      </p:sp>
     </p:spTree>
     <p:extLst>
       <p:ext uri="{BB962C8B-B14F-4D97-AF65-F5344CB8AC3E}">

</xml_diff>